<commit_message>
new urs and ppt
new urs and ppt
</commit_message>
<xml_diff>
--- a/Agendas/meeting 17.10.2016.pptx
+++ b/Agendas/meeting 17.10.2016.pptx
@@ -155,6 +155,9 @@
           </p14:sldIdLst>
         </p14:section>
       </p14:sectionLst>
+    </p:ext>
+    <p:ext uri="{EFAFB233-063F-42B5-8137-9DF3F51BA10A}">
+      <p15:sldGuideLst xmlns:p15="http://schemas.microsoft.com/office/powerpoint/2012/main"/>
     </p:ext>
   </p:extLst>
 </p:presentation>
@@ -882,7 +885,7 @@
           <a:p>
             <a:fld id="{FEF8A381-FF6B-40D3-9017-5246CF553605}" type="datetimeFigureOut">
               <a:rPr lang="en-US" smtClean="0"/>
-              <a:t>10/13/2016</a:t>
+              <a:t>10/14/2016</a:t>
             </a:fld>
             <a:endParaRPr lang="en-US"/>
           </a:p>
@@ -1133,7 +1136,7 @@
           <a:p>
             <a:fld id="{FEF8A381-FF6B-40D3-9017-5246CF553605}" type="datetimeFigureOut">
               <a:rPr lang="en-US" smtClean="0"/>
-              <a:t>10/13/2016</a:t>
+              <a:t>10/14/2016</a:t>
             </a:fld>
             <a:endParaRPr lang="en-US"/>
           </a:p>
@@ -1447,7 +1450,7 @@
           <a:p>
             <a:fld id="{FEF8A381-FF6B-40D3-9017-5246CF553605}" type="datetimeFigureOut">
               <a:rPr lang="en-US" smtClean="0"/>
-              <a:t>10/13/2016</a:t>
+              <a:t>10/14/2016</a:t>
             </a:fld>
             <a:endParaRPr lang="en-US"/>
           </a:p>
@@ -1788,7 +1791,7 @@
           <a:p>
             <a:fld id="{FEF8A381-FF6B-40D3-9017-5246CF553605}" type="datetimeFigureOut">
               <a:rPr lang="en-US" smtClean="0"/>
-              <a:t>10/13/2016</a:t>
+              <a:t>10/14/2016</a:t>
             </a:fld>
             <a:endParaRPr lang="en-US"/>
           </a:p>
@@ -2102,7 +2105,7 @@
           <a:p>
             <a:fld id="{FEF8A381-FF6B-40D3-9017-5246CF553605}" type="datetimeFigureOut">
               <a:rPr lang="en-US" smtClean="0"/>
-              <a:t>10/13/2016</a:t>
+              <a:t>10/14/2016</a:t>
             </a:fld>
             <a:endParaRPr lang="en-US"/>
           </a:p>
@@ -2495,7 +2498,7 @@
           <a:p>
             <a:fld id="{FEF8A381-FF6B-40D3-9017-5246CF553605}" type="datetimeFigureOut">
               <a:rPr lang="en-US" smtClean="0"/>
-              <a:t>10/13/2016</a:t>
+              <a:t>10/14/2016</a:t>
             </a:fld>
             <a:endParaRPr lang="en-US"/>
           </a:p>
@@ -2665,7 +2668,7 @@
           <a:p>
             <a:fld id="{FEF8A381-FF6B-40D3-9017-5246CF553605}" type="datetimeFigureOut">
               <a:rPr lang="en-US" smtClean="0"/>
-              <a:t>10/13/2016</a:t>
+              <a:t>10/14/2016</a:t>
             </a:fld>
             <a:endParaRPr lang="en-US"/>
           </a:p>
@@ -2845,7 +2848,7 @@
           <a:p>
             <a:fld id="{FEF8A381-FF6B-40D3-9017-5246CF553605}" type="datetimeFigureOut">
               <a:rPr lang="en-US" smtClean="0"/>
-              <a:t>10/13/2016</a:t>
+              <a:t>10/14/2016</a:t>
             </a:fld>
             <a:endParaRPr lang="en-US"/>
           </a:p>
@@ -3021,7 +3024,7 @@
           <a:p>
             <a:fld id="{FEF8A381-FF6B-40D3-9017-5246CF553605}" type="datetimeFigureOut">
               <a:rPr lang="en-US" smtClean="0"/>
-              <a:t>10/13/2016</a:t>
+              <a:t>10/14/2016</a:t>
             </a:fld>
             <a:endParaRPr lang="en-US"/>
           </a:p>
@@ -3268,7 +3271,7 @@
           <a:p>
             <a:fld id="{FEF8A381-FF6B-40D3-9017-5246CF553605}" type="datetimeFigureOut">
               <a:rPr lang="en-US" smtClean="0"/>
-              <a:t>10/13/2016</a:t>
+              <a:t>10/14/2016</a:t>
             </a:fld>
             <a:endParaRPr lang="en-US"/>
           </a:p>
@@ -3500,7 +3503,7 @@
           <a:p>
             <a:fld id="{FEF8A381-FF6B-40D3-9017-5246CF553605}" type="datetimeFigureOut">
               <a:rPr lang="en-US" smtClean="0"/>
-              <a:t>10/13/2016</a:t>
+              <a:t>10/14/2016</a:t>
             </a:fld>
             <a:endParaRPr lang="en-US"/>
           </a:p>
@@ -3874,7 +3877,7 @@
           <a:p>
             <a:fld id="{FEF8A381-FF6B-40D3-9017-5246CF553605}" type="datetimeFigureOut">
               <a:rPr lang="en-US" smtClean="0"/>
-              <a:t>10/13/2016</a:t>
+              <a:t>10/14/2016</a:t>
             </a:fld>
             <a:endParaRPr lang="en-US"/>
           </a:p>
@@ -3997,7 +4000,7 @@
           <a:p>
             <a:fld id="{FEF8A381-FF6B-40D3-9017-5246CF553605}" type="datetimeFigureOut">
               <a:rPr lang="en-US" smtClean="0"/>
-              <a:t>10/13/2016</a:t>
+              <a:t>10/14/2016</a:t>
             </a:fld>
             <a:endParaRPr lang="en-US"/>
           </a:p>
@@ -4092,7 +4095,7 @@
           <a:p>
             <a:fld id="{FEF8A381-FF6B-40D3-9017-5246CF553605}" type="datetimeFigureOut">
               <a:rPr lang="en-US" smtClean="0"/>
-              <a:t>10/13/2016</a:t>
+              <a:t>10/14/2016</a:t>
             </a:fld>
             <a:endParaRPr lang="en-US"/>
           </a:p>
@@ -4347,7 +4350,7 @@
           <a:p>
             <a:fld id="{FEF8A381-FF6B-40D3-9017-5246CF553605}" type="datetimeFigureOut">
               <a:rPr lang="en-US" smtClean="0"/>
-              <a:t>10/13/2016</a:t>
+              <a:t>10/14/2016</a:t>
             </a:fld>
             <a:endParaRPr lang="en-US"/>
           </a:p>
@@ -4610,7 +4613,7 @@
           <a:p>
             <a:fld id="{FEF8A381-FF6B-40D3-9017-5246CF553605}" type="datetimeFigureOut">
               <a:rPr lang="en-US" smtClean="0"/>
-              <a:t>10/13/2016</a:t>
+              <a:t>10/14/2016</a:t>
             </a:fld>
             <a:endParaRPr lang="en-US"/>
           </a:p>
@@ -5353,7 +5356,7 @@
           <a:p>
             <a:fld id="{FEF8A381-FF6B-40D3-9017-5246CF553605}" type="datetimeFigureOut">
               <a:rPr lang="en-US" smtClean="0"/>
-              <a:t>10/13/2016</a:t>
+              <a:t>10/14/2016</a:t>
             </a:fld>
             <a:endParaRPr lang="en-US"/>
           </a:p>
@@ -7147,7 +7150,7 @@
         </p:nvGraphicFramePr>
         <p:xfrm>
           <a:off x="834186" y="2245896"/>
-          <a:ext cx="8839202" cy="3946356"/>
+          <a:ext cx="8839202" cy="4023360"/>
         </p:xfrm>
         <a:graphic>
           <a:graphicData uri="http://schemas.openxmlformats.org/drawingml/2006/table">
@@ -7159,14 +7162,14 @@
                 <a:gridCol w="4419601">
                   <a:extLst>
                     <a:ext uri="{9D8B030D-6E8A-4147-A177-3AD203B41FA5}">
-                      <a16:colId xmlns:a16="http://schemas.microsoft.com/office/drawing/2014/main" val="4140957435"/>
+                      <a16:colId xmlns="" xmlns:a16="http://schemas.microsoft.com/office/drawing/2014/main" val="4140957435"/>
                     </a:ext>
                   </a:extLst>
                 </a:gridCol>
                 <a:gridCol w="4419601">
                   <a:extLst>
                     <a:ext uri="{9D8B030D-6E8A-4147-A177-3AD203B41FA5}">
-                      <a16:colId xmlns:a16="http://schemas.microsoft.com/office/drawing/2014/main" val="3170388432"/>
+                      <a16:colId xmlns="" xmlns:a16="http://schemas.microsoft.com/office/drawing/2014/main" val="3170388432"/>
                     </a:ext>
                   </a:extLst>
                 </a:gridCol>
@@ -7238,7 +7241,7 @@
                 </a:tc>
                 <a:extLst>
                   <a:ext uri="{0D108BD9-81ED-4DB2-BD59-A6C34878D82A}">
-                    <a16:rowId xmlns:a16="http://schemas.microsoft.com/office/drawing/2014/main" val="2753671668"/>
+                    <a16:rowId xmlns="" xmlns:a16="http://schemas.microsoft.com/office/drawing/2014/main" val="2753671668"/>
                   </a:ext>
                 </a:extLst>
               </a:tr>
@@ -7315,7 +7318,7 @@
                 </a:tc>
                 <a:extLst>
                   <a:ext uri="{0D108BD9-81ED-4DB2-BD59-A6C34878D82A}">
-                    <a16:rowId xmlns:a16="http://schemas.microsoft.com/office/drawing/2014/main" val="2280643443"/>
+                    <a16:rowId xmlns="" xmlns:a16="http://schemas.microsoft.com/office/drawing/2014/main" val="2280643443"/>
                   </a:ext>
                 </a:extLst>
               </a:tr>
@@ -7380,7 +7383,7 @@
                 </a:tc>
                 <a:extLst>
                   <a:ext uri="{0D108BD9-81ED-4DB2-BD59-A6C34878D82A}">
-                    <a16:rowId xmlns:a16="http://schemas.microsoft.com/office/drawing/2014/main" val="2503978970"/>
+                    <a16:rowId xmlns="" xmlns:a16="http://schemas.microsoft.com/office/drawing/2014/main" val="2503978970"/>
                   </a:ext>
                 </a:extLst>
               </a:tr>
@@ -7445,7 +7448,7 @@
                 </a:tc>
                 <a:extLst>
                   <a:ext uri="{0D108BD9-81ED-4DB2-BD59-A6C34878D82A}">
-                    <a16:rowId xmlns:a16="http://schemas.microsoft.com/office/drawing/2014/main" val="2936544441"/>
+                    <a16:rowId xmlns="" xmlns:a16="http://schemas.microsoft.com/office/drawing/2014/main" val="2936544441"/>
                   </a:ext>
                 </a:extLst>
               </a:tr>
@@ -7510,7 +7513,7 @@
                 </a:tc>
                 <a:extLst>
                   <a:ext uri="{0D108BD9-81ED-4DB2-BD59-A6C34878D82A}">
-                    <a16:rowId xmlns:a16="http://schemas.microsoft.com/office/drawing/2014/main" val="3709777941"/>
+                    <a16:rowId xmlns="" xmlns:a16="http://schemas.microsoft.com/office/drawing/2014/main" val="3709777941"/>
                   </a:ext>
                 </a:extLst>
               </a:tr>
@@ -7581,7 +7584,7 @@
                 </a:tc>
                 <a:extLst>
                   <a:ext uri="{0D108BD9-81ED-4DB2-BD59-A6C34878D82A}">
-                    <a16:rowId xmlns:a16="http://schemas.microsoft.com/office/drawing/2014/main" val="1583542192"/>
+                    <a16:rowId xmlns="" xmlns:a16="http://schemas.microsoft.com/office/drawing/2014/main" val="1583542192"/>
                   </a:ext>
                 </a:extLst>
               </a:tr>

</xml_diff>